<commit_message>
.gitignore slides na lista
</commit_message>
<xml_diff>
--- a/Curso_Git_e_GitHub.pptx
+++ b/Curso_Git_e_GitHub.pptx
@@ -192,7 +192,7 @@
   <pc:docChgLst>
     <pc:chgData name="Elvir Moraes" userId="6d2f8f00182966cc" providerId="LiveId" clId="{37B577B9-F1F8-4265-9C7F-F600D9CF7472}"/>
     <pc:docChg chg="modSld">
-      <pc:chgData name="Elvir Moraes" userId="6d2f8f00182966cc" providerId="LiveId" clId="{37B577B9-F1F8-4265-9C7F-F600D9CF7472}" dt="2023-04-29T18:03:39.931" v="1" actId="6549"/>
+      <pc:chgData name="Elvir Moraes" userId="6d2f8f00182966cc" providerId="LiveId" clId="{37B577B9-F1F8-4265-9C7F-F600D9CF7472}" dt="2023-05-01T21:20:05.148" v="3" actId="20577"/>
       <pc:docMkLst>
         <pc:docMk/>
       </pc:docMkLst>
@@ -208,6 +208,21 @@
             <pc:docMk/>
             <pc:sldMk cId="1226849539" sldId="280"/>
             <ac:spMk id="2" creationId="{A7008D65-335A-2E2B-2CA4-62F9F570EFB9}"/>
+          </ac:spMkLst>
+        </pc:spChg>
+      </pc:sldChg>
+      <pc:sldChg chg="modSp mod">
+        <pc:chgData name="Elvir Moraes" userId="6d2f8f00182966cc" providerId="LiveId" clId="{37B577B9-F1F8-4265-9C7F-F600D9CF7472}" dt="2023-05-01T21:20:05.148" v="3" actId="20577"/>
+        <pc:sldMkLst>
+          <pc:docMk/>
+          <pc:sldMk cId="3277734600" sldId="281"/>
+        </pc:sldMkLst>
+        <pc:spChg chg="mod">
+          <ac:chgData name="Elvir Moraes" userId="6d2f8f00182966cc" providerId="LiveId" clId="{37B577B9-F1F8-4265-9C7F-F600D9CF7472}" dt="2023-05-01T21:20:05.148" v="3" actId="20577"/>
+          <ac:spMkLst>
+            <pc:docMk/>
+            <pc:sldMk cId="3277734600" sldId="281"/>
+            <ac:spMk id="2" creationId="{58FC687F-1D4D-A283-061E-3351A2F9627F}"/>
           </ac:spMkLst>
         </pc:spChg>
       </pc:sldChg>
@@ -363,7 +378,7 @@
           <a:p>
             <a:fld id="{AD50AD55-8EBF-4970-9138-6A0F9DED2080}" type="datetimeFigureOut">
               <a:rPr lang="pt-BR" smtClean="0"/>
-              <a:t>29/04/2023</a:t>
+              <a:t>01/05/2023</a:t>
             </a:fld>
             <a:endParaRPr lang="pt-BR"/>
           </a:p>
@@ -561,7 +576,7 @@
           <a:p>
             <a:fld id="{AD50AD55-8EBF-4970-9138-6A0F9DED2080}" type="datetimeFigureOut">
               <a:rPr lang="pt-BR" smtClean="0"/>
-              <a:t>29/04/2023</a:t>
+              <a:t>01/05/2023</a:t>
             </a:fld>
             <a:endParaRPr lang="pt-BR"/>
           </a:p>
@@ -769,7 +784,7 @@
           <a:p>
             <a:fld id="{AD50AD55-8EBF-4970-9138-6A0F9DED2080}" type="datetimeFigureOut">
               <a:rPr lang="pt-BR" smtClean="0"/>
-              <a:t>29/04/2023</a:t>
+              <a:t>01/05/2023</a:t>
             </a:fld>
             <a:endParaRPr lang="pt-BR"/>
           </a:p>
@@ -967,7 +982,7 @@
           <a:p>
             <a:fld id="{AD50AD55-8EBF-4970-9138-6A0F9DED2080}" type="datetimeFigureOut">
               <a:rPr lang="pt-BR" smtClean="0"/>
-              <a:t>29/04/2023</a:t>
+              <a:t>01/05/2023</a:t>
             </a:fld>
             <a:endParaRPr lang="pt-BR"/>
           </a:p>
@@ -1242,7 +1257,7 @@
           <a:p>
             <a:fld id="{AD50AD55-8EBF-4970-9138-6A0F9DED2080}" type="datetimeFigureOut">
               <a:rPr lang="pt-BR" smtClean="0"/>
-              <a:t>29/04/2023</a:t>
+              <a:t>01/05/2023</a:t>
             </a:fld>
             <a:endParaRPr lang="pt-BR"/>
           </a:p>
@@ -1507,7 +1522,7 @@
           <a:p>
             <a:fld id="{AD50AD55-8EBF-4970-9138-6A0F9DED2080}" type="datetimeFigureOut">
               <a:rPr lang="pt-BR" smtClean="0"/>
-              <a:t>29/04/2023</a:t>
+              <a:t>01/05/2023</a:t>
             </a:fld>
             <a:endParaRPr lang="pt-BR"/>
           </a:p>
@@ -1919,7 +1934,7 @@
           <a:p>
             <a:fld id="{AD50AD55-8EBF-4970-9138-6A0F9DED2080}" type="datetimeFigureOut">
               <a:rPr lang="pt-BR" smtClean="0"/>
-              <a:t>29/04/2023</a:t>
+              <a:t>01/05/2023</a:t>
             </a:fld>
             <a:endParaRPr lang="pt-BR"/>
           </a:p>
@@ -2060,7 +2075,7 @@
           <a:p>
             <a:fld id="{AD50AD55-8EBF-4970-9138-6A0F9DED2080}" type="datetimeFigureOut">
               <a:rPr lang="pt-BR" smtClean="0"/>
-              <a:t>29/04/2023</a:t>
+              <a:t>01/05/2023</a:t>
             </a:fld>
             <a:endParaRPr lang="pt-BR"/>
           </a:p>
@@ -2173,7 +2188,7 @@
           <a:p>
             <a:fld id="{AD50AD55-8EBF-4970-9138-6A0F9DED2080}" type="datetimeFigureOut">
               <a:rPr lang="pt-BR" smtClean="0"/>
-              <a:t>29/04/2023</a:t>
+              <a:t>01/05/2023</a:t>
             </a:fld>
             <a:endParaRPr lang="pt-BR"/>
           </a:p>
@@ -2484,7 +2499,7 @@
           <a:p>
             <a:fld id="{AD50AD55-8EBF-4970-9138-6A0F9DED2080}" type="datetimeFigureOut">
               <a:rPr lang="pt-BR" smtClean="0"/>
-              <a:t>29/04/2023</a:t>
+              <a:t>01/05/2023</a:t>
             </a:fld>
             <a:endParaRPr lang="pt-BR"/>
           </a:p>
@@ -2772,7 +2787,7 @@
           <a:p>
             <a:fld id="{AD50AD55-8EBF-4970-9138-6A0F9DED2080}" type="datetimeFigureOut">
               <a:rPr lang="pt-BR" smtClean="0"/>
-              <a:t>29/04/2023</a:t>
+              <a:t>01/05/2023</a:t>
             </a:fld>
             <a:endParaRPr lang="pt-BR"/>
           </a:p>
@@ -3013,7 +3028,7 @@
           <a:p>
             <a:fld id="{AD50AD55-8EBF-4970-9138-6A0F9DED2080}" type="datetimeFigureOut">
               <a:rPr lang="pt-BR" smtClean="0"/>
-              <a:t>29/04/2023</a:t>
+              <a:t>01/05/2023</a:t>
             </a:fld>
             <a:endParaRPr lang="pt-BR"/>
           </a:p>
@@ -6426,7 +6441,7 @@
           <a:p>
             <a:r>
               <a:rPr lang="pt-BR" dirty="0"/>
-              <a:t>Consultando o histórica/fazendo busca de arquivos na </a:t>
+              <a:t>Consultando o histórico/fazendo busca de arquivos na </a:t>
             </a:r>
             <a:r>
               <a:rPr lang="pt-BR" dirty="0" err="1"/>

</xml_diff>